<commit_message>
move questions to first slide of intro slide
</commit_message>
<xml_diff>
--- a/Intro_slides.pptx
+++ b/Intro_slides.pptx
@@ -262,7 +262,7 @@
           <a:p>
             <a:fld id="{2F8B64F6-1F91-C543-807D-44AE4B4A24F9}" type="datetimeFigureOut">
               <a:rPr lang="en-US" smtClean="0"/>
-              <a:t>4/6/21</a:t>
+              <a:t>4/7/21</a:t>
             </a:fld>
             <a:endParaRPr lang="en-US"/>
           </a:p>
@@ -460,7 +460,7 @@
           <a:p>
             <a:fld id="{2F8B64F6-1F91-C543-807D-44AE4B4A24F9}" type="datetimeFigureOut">
               <a:rPr lang="en-US" smtClean="0"/>
-              <a:t>4/6/21</a:t>
+              <a:t>4/7/21</a:t>
             </a:fld>
             <a:endParaRPr lang="en-US"/>
           </a:p>
@@ -668,7 +668,7 @@
           <a:p>
             <a:fld id="{2F8B64F6-1F91-C543-807D-44AE4B4A24F9}" type="datetimeFigureOut">
               <a:rPr lang="en-US" smtClean="0"/>
-              <a:t>4/6/21</a:t>
+              <a:t>4/7/21</a:t>
             </a:fld>
             <a:endParaRPr lang="en-US"/>
           </a:p>
@@ -866,7 +866,7 @@
           <a:p>
             <a:fld id="{2F8B64F6-1F91-C543-807D-44AE4B4A24F9}" type="datetimeFigureOut">
               <a:rPr lang="en-US" smtClean="0"/>
-              <a:t>4/6/21</a:t>
+              <a:t>4/7/21</a:t>
             </a:fld>
             <a:endParaRPr lang="en-US"/>
           </a:p>
@@ -1141,7 +1141,7 @@
           <a:p>
             <a:fld id="{2F8B64F6-1F91-C543-807D-44AE4B4A24F9}" type="datetimeFigureOut">
               <a:rPr lang="en-US" smtClean="0"/>
-              <a:t>4/6/21</a:t>
+              <a:t>4/7/21</a:t>
             </a:fld>
             <a:endParaRPr lang="en-US"/>
           </a:p>
@@ -1406,7 +1406,7 @@
           <a:p>
             <a:fld id="{2F8B64F6-1F91-C543-807D-44AE4B4A24F9}" type="datetimeFigureOut">
               <a:rPr lang="en-US" smtClean="0"/>
-              <a:t>4/6/21</a:t>
+              <a:t>4/7/21</a:t>
             </a:fld>
             <a:endParaRPr lang="en-US"/>
           </a:p>
@@ -1818,7 +1818,7 @@
           <a:p>
             <a:fld id="{2F8B64F6-1F91-C543-807D-44AE4B4A24F9}" type="datetimeFigureOut">
               <a:rPr lang="en-US" smtClean="0"/>
-              <a:t>4/6/21</a:t>
+              <a:t>4/7/21</a:t>
             </a:fld>
             <a:endParaRPr lang="en-US"/>
           </a:p>
@@ -1959,7 +1959,7 @@
           <a:p>
             <a:fld id="{2F8B64F6-1F91-C543-807D-44AE4B4A24F9}" type="datetimeFigureOut">
               <a:rPr lang="en-US" smtClean="0"/>
-              <a:t>4/6/21</a:t>
+              <a:t>4/7/21</a:t>
             </a:fld>
             <a:endParaRPr lang="en-US"/>
           </a:p>
@@ -2072,7 +2072,7 @@
           <a:p>
             <a:fld id="{2F8B64F6-1F91-C543-807D-44AE4B4A24F9}" type="datetimeFigureOut">
               <a:rPr lang="en-US" smtClean="0"/>
-              <a:t>4/6/21</a:t>
+              <a:t>4/7/21</a:t>
             </a:fld>
             <a:endParaRPr lang="en-US"/>
           </a:p>
@@ -2383,7 +2383,7 @@
           <a:p>
             <a:fld id="{2F8B64F6-1F91-C543-807D-44AE4B4A24F9}" type="datetimeFigureOut">
               <a:rPr lang="en-US" smtClean="0"/>
-              <a:t>4/6/21</a:t>
+              <a:t>4/7/21</a:t>
             </a:fld>
             <a:endParaRPr lang="en-US"/>
           </a:p>
@@ -2671,7 +2671,7 @@
           <a:p>
             <a:fld id="{2F8B64F6-1F91-C543-807D-44AE4B4A24F9}" type="datetimeFigureOut">
               <a:rPr lang="en-US" smtClean="0"/>
-              <a:t>4/6/21</a:t>
+              <a:t>4/7/21</a:t>
             </a:fld>
             <a:endParaRPr lang="en-US"/>
           </a:p>
@@ -2912,7 +2912,7 @@
           <a:p>
             <a:fld id="{2F8B64F6-1F91-C543-807D-44AE4B4A24F9}" type="datetimeFigureOut">
               <a:rPr lang="en-US" smtClean="0"/>
-              <a:t>4/6/21</a:t>
+              <a:t>4/7/21</a:t>
             </a:fld>
             <a:endParaRPr lang="en-US"/>
           </a:p>
@@ -3345,39 +3345,45 @@
             <p:ph type="ctrTitle"/>
           </p:nvPr>
         </p:nvSpPr>
-        <p:spPr/>
-        <p:txBody>
-          <a:bodyPr>
-            <a:normAutofit fontScale="90000"/>
-          </a:bodyPr>
-          <a:lstStyle/>
-          <a:p>
-            <a:r>
-              <a:rPr lang="en-US" dirty="0"/>
-              <a:t>Introduction to Bayesian analysis for developmental researchers</a:t>
-            </a:r>
-          </a:p>
-        </p:txBody>
-      </p:sp>
-      <p:sp>
-        <p:nvSpPr>
-          <p:cNvPr id="3" name="Subtitle 2">
-            <a:extLst>
-              <a:ext uri="{FF2B5EF4-FFF2-40B4-BE49-F238E27FC236}">
-                <a16:creationId xmlns:a16="http://schemas.microsoft.com/office/drawing/2014/main" id="{64FF8684-8A7B-4A43-885F-2A34932E9982}"/>
-              </a:ext>
-            </a:extLst>
-          </p:cNvPr>
-          <p:cNvSpPr>
-            <a:spLocks noGrp="1"/>
-          </p:cNvSpPr>
-          <p:nvPr>
-            <p:ph type="subTitle" idx="1"/>
-          </p:nvPr>
-        </p:nvSpPr>
         <p:spPr>
           <a:xfrm>
-            <a:off x="1524000" y="3602038"/>
+            <a:off x="257173" y="-347146"/>
+            <a:ext cx="10467191" cy="2387600"/>
+          </a:xfrm>
+        </p:spPr>
+        <p:txBody>
+          <a:bodyPr>
+            <a:normAutofit/>
+          </a:bodyPr>
+          <a:lstStyle/>
+          <a:p>
+            <a:pPr algn="l"/>
+            <a:r>
+              <a:rPr lang="en-US" dirty="0"/>
+              <a:t>Introduction to Bayesian analyses for developmental researchers</a:t>
+            </a:r>
+          </a:p>
+        </p:txBody>
+      </p:sp>
+      <p:sp>
+        <p:nvSpPr>
+          <p:cNvPr id="3" name="Subtitle 2">
+            <a:extLst>
+              <a:ext uri="{FF2B5EF4-FFF2-40B4-BE49-F238E27FC236}">
+                <a16:creationId xmlns:a16="http://schemas.microsoft.com/office/drawing/2014/main" id="{64FF8684-8A7B-4A43-885F-2A34932E9982}"/>
+              </a:ext>
+            </a:extLst>
+          </p:cNvPr>
+          <p:cNvSpPr>
+            <a:spLocks noGrp="1"/>
+          </p:cNvSpPr>
+          <p:nvPr>
+            <p:ph type="subTitle" idx="1"/>
+          </p:nvPr>
+        </p:nvSpPr>
+        <p:spPr>
+          <a:xfrm>
+            <a:off x="-562983" y="1654904"/>
             <a:ext cx="9448800" cy="1681162"/>
           </a:xfrm>
         </p:spPr>
@@ -3397,6 +3403,178 @@
               <a:rPr lang="en-US" dirty="0"/>
               <a:t>SRCD 2021 Professional Developmental Session</a:t>
             </a:r>
+          </a:p>
+        </p:txBody>
+      </p:sp>
+      <p:sp>
+        <p:nvSpPr>
+          <p:cNvPr id="4" name="TextBox 3">
+            <a:extLst>
+              <a:ext uri="{FF2B5EF4-FFF2-40B4-BE49-F238E27FC236}">
+                <a16:creationId xmlns:a16="http://schemas.microsoft.com/office/drawing/2014/main" id="{DA7B5848-EC1B-7B4D-98A1-D3A8607F5B94}"/>
+              </a:ext>
+            </a:extLst>
+          </p:cNvPr>
+          <p:cNvSpPr txBox="1"/>
+          <p:nvPr/>
+        </p:nvSpPr>
+        <p:spPr>
+          <a:xfrm>
+            <a:off x="309709" y="3191063"/>
+            <a:ext cx="7234091" cy="3046988"/>
+          </a:xfrm>
+          <a:prstGeom prst="rect">
+            <a:avLst/>
+          </a:prstGeom>
+        </p:spPr>
+        <p:style>
+          <a:lnRef idx="2">
+            <a:schemeClr val="accent1"/>
+          </a:lnRef>
+          <a:fillRef idx="1">
+            <a:schemeClr val="lt1"/>
+          </a:fillRef>
+          <a:effectRef idx="0">
+            <a:schemeClr val="accent1"/>
+          </a:effectRef>
+          <a:fontRef idx="minor">
+            <a:schemeClr val="dk1"/>
+          </a:fontRef>
+        </p:style>
+        <p:txBody>
+          <a:bodyPr wrap="square" rtlCol="0">
+            <a:spAutoFit/>
+          </a:bodyPr>
+          <a:lstStyle/>
+          <a:p>
+            <a:r>
+              <a:rPr lang="en-US" sz="2400" b="1" dirty="0"/>
+              <a:t>Introduce yourself in the chat!</a:t>
+            </a:r>
+          </a:p>
+          <a:p>
+            <a:pPr marL="342900" indent="-342900">
+              <a:buAutoNum type="arabicPeriod"/>
+            </a:pPr>
+            <a:r>
+              <a:rPr lang="en-US" sz="2400" dirty="0"/>
+              <a:t>Where are you calling in from? (geography or institution)</a:t>
+            </a:r>
+          </a:p>
+          <a:p>
+            <a:pPr marL="342900" indent="-342900">
+              <a:buAutoNum type="arabicPeriod"/>
+            </a:pPr>
+            <a:r>
+              <a:rPr lang="en-US" sz="2400" dirty="0"/>
+              <a:t>Are you a graduate student? Postdoc? Professor? Alternative Researcher? ...</a:t>
+            </a:r>
+          </a:p>
+          <a:p>
+            <a:pPr marL="342900" indent="-342900">
+              <a:buAutoNum type="arabicPeriod"/>
+            </a:pPr>
+            <a:r>
+              <a:rPr lang="en-US" sz="2400" dirty="0"/>
+              <a:t>Do you have any familiar with {regression modeling, Bayesian modeling, both}? </a:t>
+            </a:r>
+          </a:p>
+          <a:p>
+            <a:pPr marL="342900" indent="-342900">
+              <a:buAutoNum type="arabicPeriod"/>
+            </a:pPr>
+            <a:r>
+              <a:rPr lang="en-US" sz="2400" dirty="0"/>
+              <a:t>Why did you choose to come today?</a:t>
+            </a:r>
+          </a:p>
+        </p:txBody>
+      </p:sp>
+      <p:pic>
+        <p:nvPicPr>
+          <p:cNvPr id="7" name="Picture 6">
+            <a:extLst>
+              <a:ext uri="{FF2B5EF4-FFF2-40B4-BE49-F238E27FC236}">
+                <a16:creationId xmlns:a16="http://schemas.microsoft.com/office/drawing/2014/main" id="{FA07F559-3C35-E549-ABB7-78E0EDE3C1B3}"/>
+              </a:ext>
+            </a:extLst>
+          </p:cNvPr>
+          <p:cNvPicPr>
+            <a:picLocks noChangeAspect="1"/>
+          </p:cNvPicPr>
+          <p:nvPr/>
+        </p:nvPicPr>
+        <p:blipFill>
+          <a:blip r:embed="rId2"/>
+          <a:stretch>
+            <a:fillRect/>
+          </a:stretch>
+        </p:blipFill>
+        <p:spPr>
+          <a:xfrm>
+            <a:off x="8596295" y="1922892"/>
+            <a:ext cx="3220087" cy="4440331"/>
+          </a:xfrm>
+          <a:prstGeom prst="rect">
+            <a:avLst/>
+          </a:prstGeom>
+        </p:spPr>
+      </p:pic>
+      <p:sp>
+        <p:nvSpPr>
+          <p:cNvPr id="8" name="Rectangle 7">
+            <a:extLst>
+              <a:ext uri="{FF2B5EF4-FFF2-40B4-BE49-F238E27FC236}">
+                <a16:creationId xmlns:a16="http://schemas.microsoft.com/office/drawing/2014/main" id="{654A8532-E83B-B841-ABCA-183D2E885118}"/>
+              </a:ext>
+            </a:extLst>
+          </p:cNvPr>
+          <p:cNvSpPr/>
+          <p:nvPr/>
+        </p:nvSpPr>
+        <p:spPr>
+          <a:xfrm>
+            <a:off x="8990011" y="6446545"/>
+            <a:ext cx="2432654" cy="369332"/>
+          </a:xfrm>
+          <a:prstGeom prst="rect">
+            <a:avLst/>
+          </a:prstGeom>
+        </p:spPr>
+        <p:txBody>
+          <a:bodyPr wrap="none">
+            <a:spAutoFit/>
+          </a:bodyPr>
+          <a:lstStyle/>
+          <a:p>
+            <a:r>
+              <a:rPr lang="en-US" dirty="0">
+                <a:solidFill>
+                  <a:srgbClr val="000000"/>
+                </a:solidFill>
+                <a:latin typeface="Lucida"/>
+              </a:rPr>
+              <a:t>https://</a:t>
+            </a:r>
+            <a:r>
+              <a:rPr lang="en-US" dirty="0" err="1">
+                <a:solidFill>
+                  <a:srgbClr val="000000"/>
+                </a:solidFill>
+                <a:latin typeface="Lucida"/>
+              </a:rPr>
+              <a:t>xkcd.com</a:t>
+            </a:r>
+            <a:r>
+              <a:rPr lang="en-US" dirty="0">
+                <a:solidFill>
+                  <a:srgbClr val="000000"/>
+                </a:solidFill>
+                <a:latin typeface="Lucida"/>
+              </a:rPr>
+              <a:t>/1236/</a:t>
+            </a:r>
+            <a:endParaRPr lang="en-US" dirty="0"/>
           </a:p>
         </p:txBody>
       </p:sp>
@@ -3606,7 +3784,7 @@
             <a:pPr algn="ctr"/>
             <a:r>
               <a:rPr lang="en-US" dirty="0"/>
-              <a:t>Michael Henry Tessler</a:t>
+              <a:t>Michael Henry (“MH”) Tessler</a:t>
             </a:r>
           </a:p>
         </p:txBody>
@@ -3871,7 +4049,7 @@
 </file>
 
 <file path=ppt/slides/slide4.xml><?xml version="1.0" encoding="utf-8"?>
-<p:sld xmlns:a="http://schemas.openxmlformats.org/drawingml/2006/main" xmlns:r="http://schemas.openxmlformats.org/officeDocument/2006/relationships" xmlns:p="http://schemas.openxmlformats.org/presentationml/2006/main">
+<p:sld xmlns:a="http://schemas.openxmlformats.org/drawingml/2006/main" xmlns:r="http://schemas.openxmlformats.org/officeDocument/2006/relationships" xmlns:p="http://schemas.openxmlformats.org/presentationml/2006/main" show="0">
   <p:cSld>
     <p:spTree>
       <p:nvGrpSpPr>

</xml_diff>